<commit_message>
add example for intro
</commit_message>
<xml_diff>
--- a/TD_1/Intro.pptx
+++ b/TD_1/Intro.pptx
@@ -5,14 +5,15 @@
     <p:sldMasterId id="2147483648" r:id="rId1"/>
   </p:sldMasterIdLst>
   <p:notesMasterIdLst>
-    <p:notesMasterId r:id="rId7"/>
+    <p:notesMasterId r:id="rId8"/>
   </p:notesMasterIdLst>
   <p:sldIdLst>
     <p:sldId id="257" r:id="rId2"/>
     <p:sldId id="258" r:id="rId3"/>
     <p:sldId id="261" r:id="rId4"/>
     <p:sldId id="262" r:id="rId5"/>
-    <p:sldId id="263" r:id="rId6"/>
+    <p:sldId id="264" r:id="rId6"/>
+    <p:sldId id="263" r:id="rId7"/>
   </p:sldIdLst>
   <p:sldSz cx="9144000" cy="6858000" type="screen4x3"/>
   <p:notesSz cx="6858000" cy="9144000"/>
@@ -111,6 +112,22 @@
       </a:defRPr>
     </a:lvl9pPr>
   </p:defaultTextStyle>
+  <p:extLst>
+    <p:ext uri="{EFAFB233-063F-42B5-8137-9DF3F51BA10A}">
+      <p15:sldGuideLst xmlns:p15="http://schemas.microsoft.com/office/powerpoint/2012/main">
+        <p15:guide id="1" orient="horz" pos="2160">
+          <p15:clr>
+            <a:srgbClr val="A4A3A4"/>
+          </p15:clr>
+        </p15:guide>
+        <p15:guide id="2" pos="2880">
+          <p15:clr>
+            <a:srgbClr val="A4A3A4"/>
+          </p15:clr>
+        </p15:guide>
+      </p15:sldGuideLst>
+    </p:ext>
+  </p:extLst>
 </p:presentation>
 </file>
 
@@ -196,7 +213,7 @@
           <a:p>
             <a:fld id="{96EBC148-01C0-4376-9244-5F3371F1F30B}" type="datetimeFigureOut">
               <a:rPr lang="en-US" smtClean="0"/>
-              <a:t>5/13/2018</a:t>
+              <a:t>5/14/2018</a:t>
             </a:fld>
             <a:endParaRPr lang="en-US"/>
           </a:p>
@@ -1243,6 +1260,217 @@
 </p:notes>
 </file>
 
+<file path=ppt/notesSlides/notesSlide5.xml><?xml version="1.0" encoding="utf-8"?>
+<p:notes xmlns:a="http://schemas.openxmlformats.org/drawingml/2006/main" xmlns:r="http://schemas.openxmlformats.org/officeDocument/2006/relationships" xmlns:p="http://schemas.openxmlformats.org/presentationml/2006/main">
+  <p:cSld>
+    <p:bg>
+      <p:bgPr>
+        <a:solidFill>
+          <a:srgbClr val="FFFFFF"/>
+        </a:solidFill>
+        <a:effectLst/>
+      </p:bgPr>
+    </p:bg>
+    <p:spTree>
+      <p:nvGrpSpPr>
+        <p:cNvPr id="1" name=""/>
+        <p:cNvGrpSpPr/>
+        <p:nvPr/>
+      </p:nvGrpSpPr>
+      <p:grpSpPr>
+        <a:xfrm>
+          <a:off x="0" y="0"/>
+          <a:ext cx="0" cy="0"/>
+          <a:chOff x="0" y="0"/>
+          <a:chExt cx="0" cy="0"/>
+        </a:xfrm>
+      </p:grpSpPr>
+      <p:sp>
+        <p:nvSpPr>
+          <p:cNvPr id="4098" name="Text Box 1"/>
+          <p:cNvSpPr txBox="1">
+            <a:spLocks noChangeArrowheads="1"/>
+          </p:cNvSpPr>
+          <p:nvPr/>
+        </p:nvSpPr>
+        <p:spPr bwMode="auto">
+          <a:xfrm>
+            <a:off x="1400736" y="914977"/>
+            <a:ext cx="4055129" cy="3134591"/>
+          </a:xfrm>
+          <a:prstGeom prst="rect">
+            <a:avLst/>
+          </a:prstGeom>
+          <a:solidFill>
+            <a:srgbClr val="FFFFFF"/>
+          </a:solidFill>
+          <a:ln w="9525">
+            <a:solidFill>
+              <a:srgbClr val="000000"/>
+            </a:solidFill>
+            <a:miter lim="800000"/>
+            <a:headEnd/>
+            <a:tailEnd/>
+          </a:ln>
+          <a:effectLst/>
+          <a:extLst>
+            <a:ext uri="{AF507438-7753-43E0-B8FC-AC1667EBCBE1}">
+              <a14:hiddenEffects xmlns:a14="http://schemas.microsoft.com/office/drawing/2010/main">
+                <a:effectLst>
+                  <a:outerShdw dist="35921" dir="2700000" algn="ctr" rotWithShape="0">
+                    <a:srgbClr val="808080"/>
+                  </a:outerShdw>
+                </a:effectLst>
+              </a14:hiddenEffects>
+            </a:ext>
+          </a:extLst>
+        </p:spPr>
+        <p:txBody>
+          <a:bodyPr wrap="none" lIns="85643" tIns="42821" rIns="85643" bIns="42821" anchor="ctr"/>
+          <a:lstStyle/>
+          <a:p>
+            <a:endParaRPr lang="en-US" altLang="fr-FR"/>
+          </a:p>
+        </p:txBody>
+      </p:sp>
+      <p:sp>
+        <p:nvSpPr>
+          <p:cNvPr id="4099" name="Text Box 2"/>
+          <p:cNvSpPr txBox="1">
+            <a:spLocks noGrp="1" noChangeArrowheads="1"/>
+          </p:cNvSpPr>
+          <p:nvPr>
+            <p:ph type="body"/>
+          </p:nvPr>
+        </p:nvSpPr>
+        <p:spPr>
+          <a:xfrm>
+            <a:off x="1046350" y="4352637"/>
+            <a:ext cx="4770904" cy="3478068"/>
+          </a:xfrm>
+          <a:noFill/>
+          <a:extLst>
+            <a:ext uri="{AF507438-7753-43E0-B8FC-AC1667EBCBE1}">
+              <a14:hiddenEffects xmlns:a14="http://schemas.microsoft.com/office/drawing/2010/main">
+                <a:effectLst>
+                  <a:outerShdw dist="35921" dir="2700000" algn="ctr" rotWithShape="0">
+                    <a:srgbClr val="808080"/>
+                  </a:outerShdw>
+                </a:effectLst>
+              </a14:hiddenEffects>
+            </a:ext>
+          </a:extLst>
+        </p:spPr>
+        <p:txBody>
+          <a:bodyPr/>
+          <a:lstStyle/>
+          <a:p>
+            <a:pPr marL="80290" indent="-80290" eaLnBrk="1">
+              <a:lnSpc>
+                <a:spcPct val="93000"/>
+              </a:lnSpc>
+              <a:spcBef>
+                <a:spcPct val="0"/>
+              </a:spcBef>
+              <a:buSzPct val="45000"/>
+              <a:tabLst>
+                <a:tab pos="678005" algn="l"/>
+                <a:tab pos="1356009" algn="l"/>
+                <a:tab pos="2034014" algn="l"/>
+                <a:tab pos="2712019" algn="l"/>
+                <a:tab pos="3390024" algn="l"/>
+                <a:tab pos="4068028" algn="l"/>
+                <a:tab pos="4746033" algn="l"/>
+              </a:tabLst>
+            </a:pPr>
+            <a:r>
+              <a:rPr lang="en-GB" altLang="fr-FR" smtClean="0">
+                <a:latin typeface="Arial" pitchFamily="34" charset="0"/>
+                <a:ea typeface="msgothic" charset="0"/>
+                <a:cs typeface="msgothic" charset="0"/>
+              </a:rPr>
+              <a:t>Leaf inclination angle affects light distribution in sorghum canopies. (A) Virtual sorghum plants and sorghum plots that vary in their leaf inclination angles (orange represents a larger leaf inclination angle relative to blue). (B) Light extinction curves for virtual plots from panel A simulated under solar conditions representing 13:00 on July 13, 2013, in College Station, Texas (W96°20", N30°37"). (C) Field plots of RIL 63 and RIL 73 from which light measurements were taken. (D) Light extinction curves for field plots from panel C assayed around 15:30 on July 22, 2014, in College Station, Texas. (E) Light extinction curves for virtual plots representing RIL 63 and RIL 73 simulated under solar conditions representing 15:30 on July 22, 2014, in College Station, Texas. In both simulation and field studies, plots with smaller leaf inclination angles fit a smaller light extinction coefficient </a:t>
+            </a:r>
+            <a:r>
+              <a:rPr lang="en-GB" altLang="fr-FR" i="1" smtClean="0">
+                <a:latin typeface="Arial" pitchFamily="34" charset="0"/>
+                <a:ea typeface="msgothic" charset="0"/>
+                <a:cs typeface="msgothic" charset="0"/>
+              </a:rPr>
+              <a:t>k</a:t>
+            </a:r>
+            <a:r>
+              <a:rPr lang="en-GB" altLang="fr-FR" baseline="-33000" smtClean="0">
+                <a:latin typeface="Arial" pitchFamily="34" charset="0"/>
+                <a:ea typeface="msgothic" charset="0"/>
+                <a:cs typeface="msgothic" charset="0"/>
+              </a:rPr>
+              <a:t>2</a:t>
+            </a:r>
+            <a:r>
+              <a:rPr lang="en-GB" altLang="fr-FR" smtClean="0">
+                <a:latin typeface="Arial" pitchFamily="34" charset="0"/>
+                <a:ea typeface="msgothic" charset="0"/>
+                <a:cs typeface="msgothic" charset="0"/>
+              </a:rPr>
+              <a:t> relative to plots with larger leaf inclination angles (panels B, D, and E). </a:t>
+            </a:r>
+            <a:r>
+              <a:rPr lang="en-GB" altLang="fr-FR" i="1" smtClean="0">
+                <a:latin typeface="Arial" pitchFamily="34" charset="0"/>
+                <a:ea typeface="msgothic" charset="0"/>
+                <a:cs typeface="msgothic" charset="0"/>
+              </a:rPr>
+              <a:t>k</a:t>
+            </a:r>
+            <a:r>
+              <a:rPr lang="en-GB" altLang="fr-FR" baseline="-33000" smtClean="0">
+                <a:latin typeface="Arial" pitchFamily="34" charset="0"/>
+                <a:ea typeface="msgothic" charset="0"/>
+                <a:cs typeface="msgothic" charset="0"/>
+              </a:rPr>
+              <a:t>2</a:t>
+            </a:r>
+            <a:r>
+              <a:rPr lang="en-GB" altLang="fr-FR" smtClean="0">
+                <a:latin typeface="Arial" pitchFamily="34" charset="0"/>
+                <a:ea typeface="msgothic" charset="0"/>
+                <a:cs typeface="msgothic" charset="0"/>
+              </a:rPr>
+              <a:t> values are derived from fits to equation (2) (see </a:t>
+            </a:r>
+            <a:r>
+              <a:rPr lang="en-GB" altLang="fr-FR" i="1" smtClean="0">
+                <a:latin typeface="Arial" pitchFamily="34" charset="0"/>
+                <a:ea typeface="msgothic" charset="0"/>
+                <a:cs typeface="msgothic" charset="0"/>
+              </a:rPr>
+              <a:t>Materials and Methods</a:t>
+            </a:r>
+            <a:r>
+              <a:rPr lang="en-GB" altLang="fr-FR" smtClean="0">
+                <a:latin typeface="Arial" pitchFamily="34" charset="0"/>
+                <a:ea typeface="msgothic" charset="0"/>
+                <a:cs typeface="msgothic" charset="0"/>
+              </a:rPr>
+              <a:t>).</a:t>
+            </a:r>
+          </a:p>
+        </p:txBody>
+      </p:sp>
+    </p:spTree>
+    <p:extLst>
+      <p:ext uri="{BB962C8B-B14F-4D97-AF65-F5344CB8AC3E}">
+        <p14:creationId xmlns:p14="http://schemas.microsoft.com/office/powerpoint/2010/main" val="4111527965"/>
+      </p:ext>
+    </p:extLst>
+  </p:cSld>
+  <p:clrMapOvr>
+    <a:masterClrMapping/>
+  </p:clrMapOvr>
+</p:notes>
+</file>
+
 <file path=ppt/slideLayouts/slideLayout1.xml><?xml version="1.0" encoding="utf-8"?>
 <p:sldLayout xmlns:a="http://schemas.openxmlformats.org/drawingml/2006/main" xmlns:r="http://schemas.openxmlformats.org/officeDocument/2006/relationships" xmlns:p="http://schemas.openxmlformats.org/presentationml/2006/main" type="title" preserve="1">
   <p:cSld name="Diapositive de titre">
@@ -1424,7 +1652,7 @@
           <a:p>
             <a:fld id="{7F764DF7-321D-4EDA-ABAA-FE341B137145}" type="datetimeFigureOut">
               <a:rPr lang="en-US" smtClean="0"/>
-              <a:t>5/13/2018</a:t>
+              <a:t>5/14/2018</a:t>
             </a:fld>
             <a:endParaRPr lang="en-US"/>
           </a:p>
@@ -1594,7 +1822,7 @@
           <a:p>
             <a:fld id="{7F764DF7-321D-4EDA-ABAA-FE341B137145}" type="datetimeFigureOut">
               <a:rPr lang="en-US" smtClean="0"/>
-              <a:t>5/13/2018</a:t>
+              <a:t>5/14/2018</a:t>
             </a:fld>
             <a:endParaRPr lang="en-US"/>
           </a:p>
@@ -1774,7 +2002,7 @@
           <a:p>
             <a:fld id="{7F764DF7-321D-4EDA-ABAA-FE341B137145}" type="datetimeFigureOut">
               <a:rPr lang="en-US" smtClean="0"/>
-              <a:t>5/13/2018</a:t>
+              <a:t>5/14/2018</a:t>
             </a:fld>
             <a:endParaRPr lang="en-US"/>
           </a:p>
@@ -1944,7 +2172,7 @@
           <a:p>
             <a:fld id="{7F764DF7-321D-4EDA-ABAA-FE341B137145}" type="datetimeFigureOut">
               <a:rPr lang="en-US" smtClean="0"/>
-              <a:t>5/13/2018</a:t>
+              <a:t>5/14/2018</a:t>
             </a:fld>
             <a:endParaRPr lang="en-US"/>
           </a:p>
@@ -2190,7 +2418,7 @@
           <a:p>
             <a:fld id="{7F764DF7-321D-4EDA-ABAA-FE341B137145}" type="datetimeFigureOut">
               <a:rPr lang="en-US" smtClean="0"/>
-              <a:t>5/13/2018</a:t>
+              <a:t>5/14/2018</a:t>
             </a:fld>
             <a:endParaRPr lang="en-US"/>
           </a:p>
@@ -2478,7 +2706,7 @@
           <a:p>
             <a:fld id="{7F764DF7-321D-4EDA-ABAA-FE341B137145}" type="datetimeFigureOut">
               <a:rPr lang="en-US" smtClean="0"/>
-              <a:t>5/13/2018</a:t>
+              <a:t>5/14/2018</a:t>
             </a:fld>
             <a:endParaRPr lang="en-US"/>
           </a:p>
@@ -2900,7 +3128,7 @@
           <a:p>
             <a:fld id="{7F764DF7-321D-4EDA-ABAA-FE341B137145}" type="datetimeFigureOut">
               <a:rPr lang="en-US" smtClean="0"/>
-              <a:t>5/13/2018</a:t>
+              <a:t>5/14/2018</a:t>
             </a:fld>
             <a:endParaRPr lang="en-US"/>
           </a:p>
@@ -3018,7 +3246,7 @@
           <a:p>
             <a:fld id="{7F764DF7-321D-4EDA-ABAA-FE341B137145}" type="datetimeFigureOut">
               <a:rPr lang="en-US" smtClean="0"/>
-              <a:t>5/13/2018</a:t>
+              <a:t>5/14/2018</a:t>
             </a:fld>
             <a:endParaRPr lang="en-US"/>
           </a:p>
@@ -3113,7 +3341,7 @@
           <a:p>
             <a:fld id="{7F764DF7-321D-4EDA-ABAA-FE341B137145}" type="datetimeFigureOut">
               <a:rPr lang="en-US" smtClean="0"/>
-              <a:t>5/13/2018</a:t>
+              <a:t>5/14/2018</a:t>
             </a:fld>
             <a:endParaRPr lang="en-US"/>
           </a:p>
@@ -3390,7 +3618,7 @@
           <a:p>
             <a:fld id="{7F764DF7-321D-4EDA-ABAA-FE341B137145}" type="datetimeFigureOut">
               <a:rPr lang="en-US" smtClean="0"/>
-              <a:t>5/13/2018</a:t>
+              <a:t>5/14/2018</a:t>
             </a:fld>
             <a:endParaRPr lang="en-US"/>
           </a:p>
@@ -3643,7 +3871,7 @@
           <a:p>
             <a:fld id="{7F764DF7-321D-4EDA-ABAA-FE341B137145}" type="datetimeFigureOut">
               <a:rPr lang="en-US" smtClean="0"/>
-              <a:t>5/13/2018</a:t>
+              <a:t>5/14/2018</a:t>
             </a:fld>
             <a:endParaRPr lang="en-US"/>
           </a:p>
@@ -3856,7 +4084,7 @@
           <a:p>
             <a:fld id="{7F764DF7-321D-4EDA-ABAA-FE341B137145}" type="datetimeFigureOut">
               <a:rPr lang="en-US" smtClean="0"/>
-              <a:t>5/13/2018</a:t>
+              <a:t>5/14/2018</a:t>
             </a:fld>
             <a:endParaRPr lang="en-US"/>
           </a:p>
@@ -6152,8 +6380,8 @@
           </a:p>
         </p:txBody>
       </p:sp>
-      <mc:AlternateContent xmlns:mc="http://schemas.openxmlformats.org/markup-compatibility/2006">
-        <mc:Choice xmlns:a14="http://schemas.microsoft.com/office/drawing/2010/main" Requires="a14">
+      <mc:AlternateContent xmlns:mc="http://schemas.openxmlformats.org/markup-compatibility/2006" xmlns:a14="http://schemas.microsoft.com/office/drawing/2010/main">
+        <mc:Choice Requires="a14">
           <p:sp>
             <p:nvSpPr>
               <p:cNvPr id="5" name="ZoneTexte 4"/>
@@ -6201,7 +6429,7 @@
                           <m:supHide m:val="on"/>
                           <m:ctrlPr>
                             <a:rPr lang="fr-FR" sz="2400" b="0" i="1" smtClean="0">
-                              <a:latin typeface="Cambria Math"/>
+                              <a:latin typeface="Cambria Math" panose="02040503050406030204" pitchFamily="18" charset="0"/>
                             </a:rPr>
                           </m:ctrlPr>
                         </m:naryPr>
@@ -6222,7 +6450,7 @@
                             <m:sSubPr>
                               <m:ctrlPr>
                                 <a:rPr lang="el-GR" sz="2400" i="1">
-                                  <a:latin typeface="Cambria Math"/>
+                                  <a:latin typeface="Cambria Math" panose="02040503050406030204" pitchFamily="18" charset="0"/>
                                 </a:rPr>
                               </m:ctrlPr>
                             </m:sSubPr>
@@ -6246,7 +6474,7 @@
                                       <a:solidFill>
                                         <a:srgbClr val="FF0000"/>
                                       </a:solidFill>
-                                      <a:latin typeface="Cambria Math"/>
+                                      <a:latin typeface="Cambria Math" panose="02040503050406030204" pitchFamily="18" charset="0"/>
                                     </a:rPr>
                                   </m:ctrlPr>
                                 </m:sSubPr>
@@ -6312,7 +6540,7 @@
                             <m:sSubPr>
                               <m:ctrlPr>
                                 <a:rPr lang="el-GR" sz="2400" i="1">
-                                  <a:latin typeface="Cambria Math"/>
+                                  <a:latin typeface="Cambria Math" panose="02040503050406030204" pitchFamily="18" charset="0"/>
                                 </a:rPr>
                               </m:ctrlPr>
                             </m:sSubPr>
@@ -6346,7 +6574,7 @@
             </p:txBody>
           </p:sp>
         </mc:Choice>
-        <mc:Fallback>
+        <mc:Fallback xmlns="">
           <p:sp>
             <p:nvSpPr>
               <p:cNvPr id="5" name="ZoneTexte 4"/>
@@ -8476,6 +8704,1146 @@
       </p:grpSpPr>
       <p:sp>
         <p:nvSpPr>
+          <p:cNvPr id="2050" name="Text Box 1"/>
+          <p:cNvSpPr txBox="1">
+            <a:spLocks noChangeArrowheads="1"/>
+          </p:cNvSpPr>
+          <p:nvPr/>
+        </p:nvSpPr>
+        <p:spPr bwMode="auto">
+          <a:xfrm>
+            <a:off x="-896784" y="6093296"/>
+            <a:ext cx="8493120" cy="414764"/>
+          </a:xfrm>
+          <a:prstGeom prst="rect">
+            <a:avLst/>
+          </a:prstGeom>
+          <a:noFill/>
+          <a:ln>
+            <a:noFill/>
+          </a:ln>
+          <a:effectLst/>
+          <a:extLst>
+            <a:ext uri="{909E8E84-426E-40DD-AFC4-6F175D3DCCD1}">
+              <a14:hiddenFill xmlns:a14="http://schemas.microsoft.com/office/drawing/2010/main">
+                <a:solidFill>
+                  <a:srgbClr val="FFFFFF"/>
+                </a:solidFill>
+              </a14:hiddenFill>
+            </a:ext>
+            <a:ext uri="{91240B29-F687-4F45-9708-019B960494DF}">
+              <a14:hiddenLine xmlns:a14="http://schemas.microsoft.com/office/drawing/2010/main" w="9525">
+                <a:solidFill>
+                  <a:srgbClr val="FFFFFF"/>
+                </a:solidFill>
+                <a:round/>
+                <a:headEnd/>
+                <a:tailEnd/>
+              </a14:hiddenLine>
+            </a:ext>
+            <a:ext uri="{AF507438-7753-43E0-B8FC-AC1667EBCBE1}">
+              <a14:hiddenEffects xmlns:a14="http://schemas.microsoft.com/office/drawing/2010/main">
+                <a:effectLst>
+                  <a:outerShdw dist="35921" dir="2700000" algn="ctr" rotWithShape="0">
+                    <a:srgbClr val="808080"/>
+                  </a:outerShdw>
+                </a:effectLst>
+              </a14:hiddenEffects>
+            </a:ext>
+          </a:extLst>
+        </p:spPr>
+        <p:txBody>
+          <a:bodyPr lIns="0" tIns="0" rIns="0" bIns="0"/>
+          <a:lstStyle>
+            <a:lvl1pPr eaLnBrk="0">
+              <a:tabLst>
+                <a:tab pos="723900" algn="l"/>
+                <a:tab pos="1447800" algn="l"/>
+                <a:tab pos="2171700" algn="l"/>
+                <a:tab pos="2895600" algn="l"/>
+                <a:tab pos="3619500" algn="l"/>
+                <a:tab pos="4343400" algn="l"/>
+                <a:tab pos="5067300" algn="l"/>
+                <a:tab pos="5791200" algn="l"/>
+                <a:tab pos="6515100" algn="l"/>
+                <a:tab pos="7239000" algn="l"/>
+                <a:tab pos="7962900" algn="l"/>
+                <a:tab pos="8686800" algn="l"/>
+              </a:tabLst>
+              <a:defRPr sz="2400">
+                <a:solidFill>
+                  <a:schemeClr val="tx1"/>
+                </a:solidFill>
+                <a:latin typeface="Times New Roman" pitchFamily="18" charset="0"/>
+                <a:ea typeface="msgothic" charset="0"/>
+                <a:cs typeface="msgothic" charset="0"/>
+              </a:defRPr>
+            </a:lvl1pPr>
+            <a:lvl2pPr eaLnBrk="0">
+              <a:tabLst>
+                <a:tab pos="723900" algn="l"/>
+                <a:tab pos="1447800" algn="l"/>
+                <a:tab pos="2171700" algn="l"/>
+                <a:tab pos="2895600" algn="l"/>
+                <a:tab pos="3619500" algn="l"/>
+                <a:tab pos="4343400" algn="l"/>
+                <a:tab pos="5067300" algn="l"/>
+                <a:tab pos="5791200" algn="l"/>
+                <a:tab pos="6515100" algn="l"/>
+                <a:tab pos="7239000" algn="l"/>
+                <a:tab pos="7962900" algn="l"/>
+                <a:tab pos="8686800" algn="l"/>
+              </a:tabLst>
+              <a:defRPr sz="2400">
+                <a:solidFill>
+                  <a:schemeClr val="tx1"/>
+                </a:solidFill>
+                <a:latin typeface="Times New Roman" pitchFamily="18" charset="0"/>
+                <a:ea typeface="msgothic" charset="0"/>
+                <a:cs typeface="msgothic" charset="0"/>
+              </a:defRPr>
+            </a:lvl2pPr>
+            <a:lvl3pPr eaLnBrk="0">
+              <a:tabLst>
+                <a:tab pos="723900" algn="l"/>
+                <a:tab pos="1447800" algn="l"/>
+                <a:tab pos="2171700" algn="l"/>
+                <a:tab pos="2895600" algn="l"/>
+                <a:tab pos="3619500" algn="l"/>
+                <a:tab pos="4343400" algn="l"/>
+                <a:tab pos="5067300" algn="l"/>
+                <a:tab pos="5791200" algn="l"/>
+                <a:tab pos="6515100" algn="l"/>
+                <a:tab pos="7239000" algn="l"/>
+                <a:tab pos="7962900" algn="l"/>
+                <a:tab pos="8686800" algn="l"/>
+              </a:tabLst>
+              <a:defRPr sz="2400">
+                <a:solidFill>
+                  <a:schemeClr val="tx1"/>
+                </a:solidFill>
+                <a:latin typeface="Times New Roman" pitchFamily="18" charset="0"/>
+                <a:ea typeface="msgothic" charset="0"/>
+                <a:cs typeface="msgothic" charset="0"/>
+              </a:defRPr>
+            </a:lvl3pPr>
+            <a:lvl4pPr eaLnBrk="0">
+              <a:tabLst>
+                <a:tab pos="723900" algn="l"/>
+                <a:tab pos="1447800" algn="l"/>
+                <a:tab pos="2171700" algn="l"/>
+                <a:tab pos="2895600" algn="l"/>
+                <a:tab pos="3619500" algn="l"/>
+                <a:tab pos="4343400" algn="l"/>
+                <a:tab pos="5067300" algn="l"/>
+                <a:tab pos="5791200" algn="l"/>
+                <a:tab pos="6515100" algn="l"/>
+                <a:tab pos="7239000" algn="l"/>
+                <a:tab pos="7962900" algn="l"/>
+                <a:tab pos="8686800" algn="l"/>
+              </a:tabLst>
+              <a:defRPr sz="2400">
+                <a:solidFill>
+                  <a:schemeClr val="tx1"/>
+                </a:solidFill>
+                <a:latin typeface="Times New Roman" pitchFamily="18" charset="0"/>
+                <a:ea typeface="msgothic" charset="0"/>
+                <a:cs typeface="msgothic" charset="0"/>
+              </a:defRPr>
+            </a:lvl4pPr>
+            <a:lvl5pPr eaLnBrk="0">
+              <a:tabLst>
+                <a:tab pos="723900" algn="l"/>
+                <a:tab pos="1447800" algn="l"/>
+                <a:tab pos="2171700" algn="l"/>
+                <a:tab pos="2895600" algn="l"/>
+                <a:tab pos="3619500" algn="l"/>
+                <a:tab pos="4343400" algn="l"/>
+                <a:tab pos="5067300" algn="l"/>
+                <a:tab pos="5791200" algn="l"/>
+                <a:tab pos="6515100" algn="l"/>
+                <a:tab pos="7239000" algn="l"/>
+                <a:tab pos="7962900" algn="l"/>
+                <a:tab pos="8686800" algn="l"/>
+              </a:tabLst>
+              <a:defRPr sz="2400">
+                <a:solidFill>
+                  <a:schemeClr val="tx1"/>
+                </a:solidFill>
+                <a:latin typeface="Times New Roman" pitchFamily="18" charset="0"/>
+                <a:ea typeface="msgothic" charset="0"/>
+                <a:cs typeface="msgothic" charset="0"/>
+              </a:defRPr>
+            </a:lvl5pPr>
+            <a:lvl6pPr marL="1536700" indent="-215900" defTabSz="457200" eaLnBrk="0" fontAlgn="base" hangingPunct="0">
+              <a:lnSpc>
+                <a:spcPct val="93000"/>
+              </a:lnSpc>
+              <a:spcBef>
+                <a:spcPct val="0"/>
+              </a:spcBef>
+              <a:spcAft>
+                <a:spcPct val="0"/>
+              </a:spcAft>
+              <a:buClr>
+                <a:srgbClr val="000000"/>
+              </a:buClr>
+              <a:buSzPct val="45000"/>
+              <a:buFont typeface="Wingdings" pitchFamily="2" charset="2"/>
+              <a:tabLst>
+                <a:tab pos="723900" algn="l"/>
+                <a:tab pos="1447800" algn="l"/>
+                <a:tab pos="2171700" algn="l"/>
+                <a:tab pos="2895600" algn="l"/>
+                <a:tab pos="3619500" algn="l"/>
+                <a:tab pos="4343400" algn="l"/>
+                <a:tab pos="5067300" algn="l"/>
+                <a:tab pos="5791200" algn="l"/>
+                <a:tab pos="6515100" algn="l"/>
+                <a:tab pos="7239000" algn="l"/>
+                <a:tab pos="7962900" algn="l"/>
+                <a:tab pos="8686800" algn="l"/>
+              </a:tabLst>
+              <a:defRPr sz="2400">
+                <a:solidFill>
+                  <a:schemeClr val="tx1"/>
+                </a:solidFill>
+                <a:latin typeface="Times New Roman" pitchFamily="18" charset="0"/>
+                <a:ea typeface="msgothic" charset="0"/>
+                <a:cs typeface="msgothic" charset="0"/>
+              </a:defRPr>
+            </a:lvl6pPr>
+            <a:lvl7pPr marL="1993900" indent="-215900" defTabSz="457200" eaLnBrk="0" fontAlgn="base" hangingPunct="0">
+              <a:lnSpc>
+                <a:spcPct val="93000"/>
+              </a:lnSpc>
+              <a:spcBef>
+                <a:spcPct val="0"/>
+              </a:spcBef>
+              <a:spcAft>
+                <a:spcPct val="0"/>
+              </a:spcAft>
+              <a:buClr>
+                <a:srgbClr val="000000"/>
+              </a:buClr>
+              <a:buSzPct val="45000"/>
+              <a:buFont typeface="Wingdings" pitchFamily="2" charset="2"/>
+              <a:tabLst>
+                <a:tab pos="723900" algn="l"/>
+                <a:tab pos="1447800" algn="l"/>
+                <a:tab pos="2171700" algn="l"/>
+                <a:tab pos="2895600" algn="l"/>
+                <a:tab pos="3619500" algn="l"/>
+                <a:tab pos="4343400" algn="l"/>
+                <a:tab pos="5067300" algn="l"/>
+                <a:tab pos="5791200" algn="l"/>
+                <a:tab pos="6515100" algn="l"/>
+                <a:tab pos="7239000" algn="l"/>
+                <a:tab pos="7962900" algn="l"/>
+                <a:tab pos="8686800" algn="l"/>
+              </a:tabLst>
+              <a:defRPr sz="2400">
+                <a:solidFill>
+                  <a:schemeClr val="tx1"/>
+                </a:solidFill>
+                <a:latin typeface="Times New Roman" pitchFamily="18" charset="0"/>
+                <a:ea typeface="msgothic" charset="0"/>
+                <a:cs typeface="msgothic" charset="0"/>
+              </a:defRPr>
+            </a:lvl7pPr>
+            <a:lvl8pPr marL="2451100" indent="-215900" defTabSz="457200" eaLnBrk="0" fontAlgn="base" hangingPunct="0">
+              <a:lnSpc>
+                <a:spcPct val="93000"/>
+              </a:lnSpc>
+              <a:spcBef>
+                <a:spcPct val="0"/>
+              </a:spcBef>
+              <a:spcAft>
+                <a:spcPct val="0"/>
+              </a:spcAft>
+              <a:buClr>
+                <a:srgbClr val="000000"/>
+              </a:buClr>
+              <a:buSzPct val="45000"/>
+              <a:buFont typeface="Wingdings" pitchFamily="2" charset="2"/>
+              <a:tabLst>
+                <a:tab pos="723900" algn="l"/>
+                <a:tab pos="1447800" algn="l"/>
+                <a:tab pos="2171700" algn="l"/>
+                <a:tab pos="2895600" algn="l"/>
+                <a:tab pos="3619500" algn="l"/>
+                <a:tab pos="4343400" algn="l"/>
+                <a:tab pos="5067300" algn="l"/>
+                <a:tab pos="5791200" algn="l"/>
+                <a:tab pos="6515100" algn="l"/>
+                <a:tab pos="7239000" algn="l"/>
+                <a:tab pos="7962900" algn="l"/>
+                <a:tab pos="8686800" algn="l"/>
+              </a:tabLst>
+              <a:defRPr sz="2400">
+                <a:solidFill>
+                  <a:schemeClr val="tx1"/>
+                </a:solidFill>
+                <a:latin typeface="Times New Roman" pitchFamily="18" charset="0"/>
+                <a:ea typeface="msgothic" charset="0"/>
+                <a:cs typeface="msgothic" charset="0"/>
+              </a:defRPr>
+            </a:lvl8pPr>
+            <a:lvl9pPr marL="2908300" indent="-215900" defTabSz="457200" eaLnBrk="0" fontAlgn="base" hangingPunct="0">
+              <a:lnSpc>
+                <a:spcPct val="93000"/>
+              </a:lnSpc>
+              <a:spcBef>
+                <a:spcPct val="0"/>
+              </a:spcBef>
+              <a:spcAft>
+                <a:spcPct val="0"/>
+              </a:spcAft>
+              <a:buClr>
+                <a:srgbClr val="000000"/>
+              </a:buClr>
+              <a:buSzPct val="45000"/>
+              <a:buFont typeface="Wingdings" pitchFamily="2" charset="2"/>
+              <a:tabLst>
+                <a:tab pos="723900" algn="l"/>
+                <a:tab pos="1447800" algn="l"/>
+                <a:tab pos="2171700" algn="l"/>
+                <a:tab pos="2895600" algn="l"/>
+                <a:tab pos="3619500" algn="l"/>
+                <a:tab pos="4343400" algn="l"/>
+                <a:tab pos="5067300" algn="l"/>
+                <a:tab pos="5791200" algn="l"/>
+                <a:tab pos="6515100" algn="l"/>
+                <a:tab pos="7239000" algn="l"/>
+                <a:tab pos="7962900" algn="l"/>
+                <a:tab pos="8686800" algn="l"/>
+              </a:tabLst>
+              <a:defRPr sz="2400">
+                <a:solidFill>
+                  <a:schemeClr val="tx1"/>
+                </a:solidFill>
+                <a:latin typeface="Times New Roman" pitchFamily="18" charset="0"/>
+                <a:ea typeface="msgothic" charset="0"/>
+                <a:cs typeface="msgothic" charset="0"/>
+              </a:defRPr>
+            </a:lvl9pPr>
+          </a:lstStyle>
+          <a:p>
+            <a:pPr algn="ctr" eaLnBrk="1"/>
+            <a:r>
+              <a:rPr lang="en-GB" altLang="fr-FR" sz="1500" b="1">
+                <a:solidFill>
+                  <a:srgbClr val="000000"/>
+                </a:solidFill>
+                <a:latin typeface="Arial" pitchFamily="34" charset="0"/>
+              </a:rPr>
+              <a:t>Leaf inclination angle affects light distribution in sorghum canopies. </a:t>
+            </a:r>
+          </a:p>
+        </p:txBody>
+      </p:sp>
+      <p:pic>
+        <p:nvPicPr>
+          <p:cNvPr id="2051" name="Picture 2"/>
+          <p:cNvPicPr>
+            <a:picLocks noChangeAspect="1" noChangeArrowheads="1"/>
+          </p:cNvPicPr>
+          <p:nvPr/>
+        </p:nvPicPr>
+        <p:blipFill>
+          <a:blip r:embed="rId3">
+            <a:extLst>
+              <a:ext uri="{28A0092B-C50C-407E-A947-70E740481C1C}">
+                <a14:useLocalDpi xmlns:a14="http://schemas.microsoft.com/office/drawing/2010/main" val="0"/>
+              </a:ext>
+            </a:extLst>
+          </a:blip>
+          <a:srcRect/>
+          <a:stretch>
+            <a:fillRect/>
+          </a:stretch>
+        </p:blipFill>
+        <p:spPr bwMode="auto">
+          <a:xfrm>
+            <a:off x="7004161" y="6286260"/>
+            <a:ext cx="1916640" cy="397482"/>
+          </a:xfrm>
+          <a:prstGeom prst="rect">
+            <a:avLst/>
+          </a:prstGeom>
+          <a:noFill/>
+          <a:ln>
+            <a:noFill/>
+          </a:ln>
+          <a:effectLst/>
+          <a:extLst>
+            <a:ext uri="{909E8E84-426E-40DD-AFC4-6F175D3DCCD1}">
+              <a14:hiddenFill xmlns:a14="http://schemas.microsoft.com/office/drawing/2010/main">
+                <a:blipFill dpi="0" rotWithShape="0">
+                  <a:blip/>
+                  <a:srcRect/>
+                  <a:stretch>
+                    <a:fillRect/>
+                  </a:stretch>
+                </a:blipFill>
+              </a14:hiddenFill>
+            </a:ext>
+            <a:ext uri="{91240B29-F687-4F45-9708-019B960494DF}">
+              <a14:hiddenLine xmlns:a14="http://schemas.microsoft.com/office/drawing/2010/main" w="9525">
+                <a:solidFill>
+                  <a:srgbClr val="FFFFFF"/>
+                </a:solidFill>
+                <a:round/>
+                <a:headEnd/>
+                <a:tailEnd/>
+              </a14:hiddenLine>
+            </a:ext>
+            <a:ext uri="{AF507438-7753-43E0-B8FC-AC1667EBCBE1}">
+              <a14:hiddenEffects xmlns:a14="http://schemas.microsoft.com/office/drawing/2010/main">
+                <a:effectLst>
+                  <a:outerShdw dist="35921" dir="2700000" algn="ctr" rotWithShape="0">
+                    <a:srgbClr val="808080"/>
+                  </a:outerShdw>
+                </a:effectLst>
+              </a14:hiddenEffects>
+            </a:ext>
+          </a:extLst>
+        </p:spPr>
+      </p:pic>
+      <p:pic>
+        <p:nvPicPr>
+          <p:cNvPr id="2052" name="Picture 3"/>
+          <p:cNvPicPr>
+            <a:picLocks noChangeAspect="1" noChangeArrowheads="1"/>
+          </p:cNvPicPr>
+          <p:nvPr/>
+        </p:nvPicPr>
+        <p:blipFill>
+          <a:blip r:embed="rId4">
+            <a:extLst>
+              <a:ext uri="{28A0092B-C50C-407E-A947-70E740481C1C}">
+                <a14:useLocalDpi xmlns:a14="http://schemas.microsoft.com/office/drawing/2010/main" val="0"/>
+              </a:ext>
+            </a:extLst>
+          </a:blip>
+          <a:srcRect/>
+          <a:stretch>
+            <a:fillRect/>
+          </a:stretch>
+        </p:blipFill>
+        <p:spPr bwMode="auto">
+          <a:xfrm>
+            <a:off x="717120" y="979303"/>
+            <a:ext cx="7714080" cy="4893634"/>
+          </a:xfrm>
+          <a:prstGeom prst="rect">
+            <a:avLst/>
+          </a:prstGeom>
+          <a:noFill/>
+          <a:ln>
+            <a:noFill/>
+          </a:ln>
+          <a:effectLst/>
+          <a:extLst>
+            <a:ext uri="{909E8E84-426E-40DD-AFC4-6F175D3DCCD1}">
+              <a14:hiddenFill xmlns:a14="http://schemas.microsoft.com/office/drawing/2010/main">
+                <a:blipFill dpi="0" rotWithShape="0">
+                  <a:blip/>
+                  <a:srcRect/>
+                  <a:stretch>
+                    <a:fillRect/>
+                  </a:stretch>
+                </a:blipFill>
+              </a14:hiddenFill>
+            </a:ext>
+            <a:ext uri="{91240B29-F687-4F45-9708-019B960494DF}">
+              <a14:hiddenLine xmlns:a14="http://schemas.microsoft.com/office/drawing/2010/main" w="9525">
+                <a:solidFill>
+                  <a:srgbClr val="FFFFFF"/>
+                </a:solidFill>
+                <a:round/>
+                <a:headEnd/>
+                <a:tailEnd/>
+              </a14:hiddenLine>
+            </a:ext>
+            <a:ext uri="{AF507438-7753-43E0-B8FC-AC1667EBCBE1}">
+              <a14:hiddenEffects xmlns:a14="http://schemas.microsoft.com/office/drawing/2010/main">
+                <a:effectLst>
+                  <a:outerShdw dist="35921" dir="2700000" algn="ctr" rotWithShape="0">
+                    <a:srgbClr val="808080"/>
+                  </a:outerShdw>
+                </a:effectLst>
+              </a14:hiddenEffects>
+            </a:ext>
+          </a:extLst>
+        </p:spPr>
+      </p:pic>
+      <p:sp>
+        <p:nvSpPr>
+          <p:cNvPr id="2053" name="Text Box 4"/>
+          <p:cNvSpPr txBox="1">
+            <a:spLocks noChangeArrowheads="1"/>
+          </p:cNvSpPr>
+          <p:nvPr/>
+        </p:nvSpPr>
+        <p:spPr bwMode="auto">
+          <a:xfrm>
+            <a:off x="2987824" y="6392128"/>
+            <a:ext cx="3918240" cy="231864"/>
+          </a:xfrm>
+          <a:prstGeom prst="rect">
+            <a:avLst/>
+          </a:prstGeom>
+          <a:noFill/>
+          <a:ln>
+            <a:noFill/>
+          </a:ln>
+          <a:effectLst/>
+          <a:extLst>
+            <a:ext uri="{909E8E84-426E-40DD-AFC4-6F175D3DCCD1}">
+              <a14:hiddenFill xmlns:a14="http://schemas.microsoft.com/office/drawing/2010/main">
+                <a:solidFill>
+                  <a:srgbClr val="FFFFFF"/>
+                </a:solidFill>
+              </a14:hiddenFill>
+            </a:ext>
+            <a:ext uri="{91240B29-F687-4F45-9708-019B960494DF}">
+              <a14:hiddenLine xmlns:a14="http://schemas.microsoft.com/office/drawing/2010/main" w="9525">
+                <a:solidFill>
+                  <a:srgbClr val="FFFFFF"/>
+                </a:solidFill>
+                <a:round/>
+                <a:headEnd/>
+                <a:tailEnd/>
+              </a14:hiddenLine>
+            </a:ext>
+            <a:ext uri="{AF507438-7753-43E0-B8FC-AC1667EBCBE1}">
+              <a14:hiddenEffects xmlns:a14="http://schemas.microsoft.com/office/drawing/2010/main">
+                <a:effectLst>
+                  <a:outerShdw dist="35921" dir="2700000" algn="ctr" rotWithShape="0">
+                    <a:srgbClr val="808080"/>
+                  </a:outerShdw>
+                </a:effectLst>
+              </a14:hiddenEffects>
+            </a:ext>
+          </a:extLst>
+        </p:spPr>
+        <p:txBody>
+          <a:bodyPr lIns="0" tIns="0" rIns="0" bIns="0"/>
+          <a:lstStyle>
+            <a:lvl1pPr eaLnBrk="0">
+              <a:tabLst>
+                <a:tab pos="723900" algn="l"/>
+                <a:tab pos="1447800" algn="l"/>
+                <a:tab pos="2171700" algn="l"/>
+                <a:tab pos="2895600" algn="l"/>
+                <a:tab pos="3619500" algn="l"/>
+              </a:tabLst>
+              <a:defRPr sz="2400">
+                <a:solidFill>
+                  <a:schemeClr val="tx1"/>
+                </a:solidFill>
+                <a:latin typeface="Times New Roman" pitchFamily="18" charset="0"/>
+                <a:ea typeface="msgothic" charset="0"/>
+                <a:cs typeface="msgothic" charset="0"/>
+              </a:defRPr>
+            </a:lvl1pPr>
+            <a:lvl2pPr eaLnBrk="0">
+              <a:tabLst>
+                <a:tab pos="723900" algn="l"/>
+                <a:tab pos="1447800" algn="l"/>
+                <a:tab pos="2171700" algn="l"/>
+                <a:tab pos="2895600" algn="l"/>
+                <a:tab pos="3619500" algn="l"/>
+              </a:tabLst>
+              <a:defRPr sz="2400">
+                <a:solidFill>
+                  <a:schemeClr val="tx1"/>
+                </a:solidFill>
+                <a:latin typeface="Times New Roman" pitchFamily="18" charset="0"/>
+                <a:ea typeface="msgothic" charset="0"/>
+                <a:cs typeface="msgothic" charset="0"/>
+              </a:defRPr>
+            </a:lvl2pPr>
+            <a:lvl3pPr eaLnBrk="0">
+              <a:tabLst>
+                <a:tab pos="723900" algn="l"/>
+                <a:tab pos="1447800" algn="l"/>
+                <a:tab pos="2171700" algn="l"/>
+                <a:tab pos="2895600" algn="l"/>
+                <a:tab pos="3619500" algn="l"/>
+              </a:tabLst>
+              <a:defRPr sz="2400">
+                <a:solidFill>
+                  <a:schemeClr val="tx1"/>
+                </a:solidFill>
+                <a:latin typeface="Times New Roman" pitchFamily="18" charset="0"/>
+                <a:ea typeface="msgothic" charset="0"/>
+                <a:cs typeface="msgothic" charset="0"/>
+              </a:defRPr>
+            </a:lvl3pPr>
+            <a:lvl4pPr eaLnBrk="0">
+              <a:tabLst>
+                <a:tab pos="723900" algn="l"/>
+                <a:tab pos="1447800" algn="l"/>
+                <a:tab pos="2171700" algn="l"/>
+                <a:tab pos="2895600" algn="l"/>
+                <a:tab pos="3619500" algn="l"/>
+              </a:tabLst>
+              <a:defRPr sz="2400">
+                <a:solidFill>
+                  <a:schemeClr val="tx1"/>
+                </a:solidFill>
+                <a:latin typeface="Times New Roman" pitchFamily="18" charset="0"/>
+                <a:ea typeface="msgothic" charset="0"/>
+                <a:cs typeface="msgothic" charset="0"/>
+              </a:defRPr>
+            </a:lvl4pPr>
+            <a:lvl5pPr eaLnBrk="0">
+              <a:tabLst>
+                <a:tab pos="723900" algn="l"/>
+                <a:tab pos="1447800" algn="l"/>
+                <a:tab pos="2171700" algn="l"/>
+                <a:tab pos="2895600" algn="l"/>
+                <a:tab pos="3619500" algn="l"/>
+              </a:tabLst>
+              <a:defRPr sz="2400">
+                <a:solidFill>
+                  <a:schemeClr val="tx1"/>
+                </a:solidFill>
+                <a:latin typeface="Times New Roman" pitchFamily="18" charset="0"/>
+                <a:ea typeface="msgothic" charset="0"/>
+                <a:cs typeface="msgothic" charset="0"/>
+              </a:defRPr>
+            </a:lvl5pPr>
+            <a:lvl6pPr marL="1536700" indent="-215900" defTabSz="457200" eaLnBrk="0" fontAlgn="base" hangingPunct="0">
+              <a:lnSpc>
+                <a:spcPct val="93000"/>
+              </a:lnSpc>
+              <a:spcBef>
+                <a:spcPct val="0"/>
+              </a:spcBef>
+              <a:spcAft>
+                <a:spcPct val="0"/>
+              </a:spcAft>
+              <a:buClr>
+                <a:srgbClr val="000000"/>
+              </a:buClr>
+              <a:buSzPct val="45000"/>
+              <a:buFont typeface="Wingdings" pitchFamily="2" charset="2"/>
+              <a:tabLst>
+                <a:tab pos="723900" algn="l"/>
+                <a:tab pos="1447800" algn="l"/>
+                <a:tab pos="2171700" algn="l"/>
+                <a:tab pos="2895600" algn="l"/>
+                <a:tab pos="3619500" algn="l"/>
+              </a:tabLst>
+              <a:defRPr sz="2400">
+                <a:solidFill>
+                  <a:schemeClr val="tx1"/>
+                </a:solidFill>
+                <a:latin typeface="Times New Roman" pitchFamily="18" charset="0"/>
+                <a:ea typeface="msgothic" charset="0"/>
+                <a:cs typeface="msgothic" charset="0"/>
+              </a:defRPr>
+            </a:lvl6pPr>
+            <a:lvl7pPr marL="1993900" indent="-215900" defTabSz="457200" eaLnBrk="0" fontAlgn="base" hangingPunct="0">
+              <a:lnSpc>
+                <a:spcPct val="93000"/>
+              </a:lnSpc>
+              <a:spcBef>
+                <a:spcPct val="0"/>
+              </a:spcBef>
+              <a:spcAft>
+                <a:spcPct val="0"/>
+              </a:spcAft>
+              <a:buClr>
+                <a:srgbClr val="000000"/>
+              </a:buClr>
+              <a:buSzPct val="45000"/>
+              <a:buFont typeface="Wingdings" pitchFamily="2" charset="2"/>
+              <a:tabLst>
+                <a:tab pos="723900" algn="l"/>
+                <a:tab pos="1447800" algn="l"/>
+                <a:tab pos="2171700" algn="l"/>
+                <a:tab pos="2895600" algn="l"/>
+                <a:tab pos="3619500" algn="l"/>
+              </a:tabLst>
+              <a:defRPr sz="2400">
+                <a:solidFill>
+                  <a:schemeClr val="tx1"/>
+                </a:solidFill>
+                <a:latin typeface="Times New Roman" pitchFamily="18" charset="0"/>
+                <a:ea typeface="msgothic" charset="0"/>
+                <a:cs typeface="msgothic" charset="0"/>
+              </a:defRPr>
+            </a:lvl7pPr>
+            <a:lvl8pPr marL="2451100" indent="-215900" defTabSz="457200" eaLnBrk="0" fontAlgn="base" hangingPunct="0">
+              <a:lnSpc>
+                <a:spcPct val="93000"/>
+              </a:lnSpc>
+              <a:spcBef>
+                <a:spcPct val="0"/>
+              </a:spcBef>
+              <a:spcAft>
+                <a:spcPct val="0"/>
+              </a:spcAft>
+              <a:buClr>
+                <a:srgbClr val="000000"/>
+              </a:buClr>
+              <a:buSzPct val="45000"/>
+              <a:buFont typeface="Wingdings" pitchFamily="2" charset="2"/>
+              <a:tabLst>
+                <a:tab pos="723900" algn="l"/>
+                <a:tab pos="1447800" algn="l"/>
+                <a:tab pos="2171700" algn="l"/>
+                <a:tab pos="2895600" algn="l"/>
+                <a:tab pos="3619500" algn="l"/>
+              </a:tabLst>
+              <a:defRPr sz="2400">
+                <a:solidFill>
+                  <a:schemeClr val="tx1"/>
+                </a:solidFill>
+                <a:latin typeface="Times New Roman" pitchFamily="18" charset="0"/>
+                <a:ea typeface="msgothic" charset="0"/>
+                <a:cs typeface="msgothic" charset="0"/>
+              </a:defRPr>
+            </a:lvl8pPr>
+            <a:lvl9pPr marL="2908300" indent="-215900" defTabSz="457200" eaLnBrk="0" fontAlgn="base" hangingPunct="0">
+              <a:lnSpc>
+                <a:spcPct val="93000"/>
+              </a:lnSpc>
+              <a:spcBef>
+                <a:spcPct val="0"/>
+              </a:spcBef>
+              <a:spcAft>
+                <a:spcPct val="0"/>
+              </a:spcAft>
+              <a:buClr>
+                <a:srgbClr val="000000"/>
+              </a:buClr>
+              <a:buSzPct val="45000"/>
+              <a:buFont typeface="Wingdings" pitchFamily="2" charset="2"/>
+              <a:tabLst>
+                <a:tab pos="723900" algn="l"/>
+                <a:tab pos="1447800" algn="l"/>
+                <a:tab pos="2171700" algn="l"/>
+                <a:tab pos="2895600" algn="l"/>
+                <a:tab pos="3619500" algn="l"/>
+              </a:tabLst>
+              <a:defRPr sz="2400">
+                <a:solidFill>
+                  <a:schemeClr val="tx1"/>
+                </a:solidFill>
+                <a:latin typeface="Times New Roman" pitchFamily="18" charset="0"/>
+                <a:ea typeface="msgothic" charset="0"/>
+                <a:cs typeface="msgothic" charset="0"/>
+              </a:defRPr>
+            </a:lvl9pPr>
+          </a:lstStyle>
+          <a:p>
+            <a:pPr eaLnBrk="1"/>
+            <a:r>
+              <a:rPr lang="en-GB" altLang="fr-FR" sz="1100" b="1" dirty="0">
+                <a:solidFill>
+                  <a:srgbClr val="000000"/>
+                </a:solidFill>
+                <a:latin typeface="Arial" pitchFamily="34" charset="0"/>
+              </a:rPr>
+              <a:t>Sandra K. Truong et al. Genetics 2015;201:1229-1238</a:t>
+            </a:r>
+          </a:p>
+        </p:txBody>
+      </p:sp>
+      <p:sp>
+        <p:nvSpPr>
+          <p:cNvPr id="2054" name="Text Box 5"/>
+          <p:cNvSpPr txBox="1">
+            <a:spLocks noChangeArrowheads="1"/>
+          </p:cNvSpPr>
+          <p:nvPr/>
+        </p:nvSpPr>
+        <p:spPr bwMode="auto">
+          <a:xfrm>
+            <a:off x="97920" y="6531087"/>
+            <a:ext cx="4930560" cy="3470764"/>
+          </a:xfrm>
+          <a:prstGeom prst="rect">
+            <a:avLst/>
+          </a:prstGeom>
+          <a:noFill/>
+          <a:ln>
+            <a:noFill/>
+          </a:ln>
+          <a:effectLst/>
+          <a:extLst>
+            <a:ext uri="{909E8E84-426E-40DD-AFC4-6F175D3DCCD1}">
+              <a14:hiddenFill xmlns:a14="http://schemas.microsoft.com/office/drawing/2010/main">
+                <a:solidFill>
+                  <a:srgbClr val="FFFFFF"/>
+                </a:solidFill>
+              </a14:hiddenFill>
+            </a:ext>
+            <a:ext uri="{91240B29-F687-4F45-9708-019B960494DF}">
+              <a14:hiddenLine xmlns:a14="http://schemas.microsoft.com/office/drawing/2010/main" w="9525">
+                <a:solidFill>
+                  <a:srgbClr val="000000"/>
+                </a:solidFill>
+                <a:round/>
+                <a:headEnd/>
+                <a:tailEnd/>
+              </a14:hiddenLine>
+            </a:ext>
+            <a:ext uri="{AF507438-7753-43E0-B8FC-AC1667EBCBE1}">
+              <a14:hiddenEffects xmlns:a14="http://schemas.microsoft.com/office/drawing/2010/main">
+                <a:effectLst>
+                  <a:outerShdw dist="35921" dir="2700000" algn="ctr" rotWithShape="0">
+                    <a:srgbClr val="808080"/>
+                  </a:outerShdw>
+                </a:effectLst>
+              </a14:hiddenEffects>
+            </a:ext>
+          </a:extLst>
+        </p:spPr>
+        <p:txBody>
+          <a:bodyPr lIns="0" tIns="0" rIns="0" bIns="0"/>
+          <a:lstStyle>
+            <a:lvl1pPr marL="85725" indent="-85725" eaLnBrk="0">
+              <a:tabLst>
+                <a:tab pos="723900" algn="l"/>
+                <a:tab pos="1447800" algn="l"/>
+                <a:tab pos="2171700" algn="l"/>
+                <a:tab pos="2895600" algn="l"/>
+                <a:tab pos="3619500" algn="l"/>
+                <a:tab pos="4343400" algn="l"/>
+                <a:tab pos="5067300" algn="l"/>
+              </a:tabLst>
+              <a:defRPr sz="2400">
+                <a:solidFill>
+                  <a:schemeClr val="tx1"/>
+                </a:solidFill>
+                <a:latin typeface="Times New Roman" pitchFamily="18" charset="0"/>
+                <a:ea typeface="msgothic" charset="0"/>
+                <a:cs typeface="msgothic" charset="0"/>
+              </a:defRPr>
+            </a:lvl1pPr>
+            <a:lvl2pPr eaLnBrk="0">
+              <a:tabLst>
+                <a:tab pos="723900" algn="l"/>
+                <a:tab pos="1447800" algn="l"/>
+                <a:tab pos="2171700" algn="l"/>
+                <a:tab pos="2895600" algn="l"/>
+                <a:tab pos="3619500" algn="l"/>
+                <a:tab pos="4343400" algn="l"/>
+                <a:tab pos="5067300" algn="l"/>
+              </a:tabLst>
+              <a:defRPr sz="2400">
+                <a:solidFill>
+                  <a:schemeClr val="tx1"/>
+                </a:solidFill>
+                <a:latin typeface="Times New Roman" pitchFamily="18" charset="0"/>
+                <a:ea typeface="msgothic" charset="0"/>
+                <a:cs typeface="msgothic" charset="0"/>
+              </a:defRPr>
+            </a:lvl2pPr>
+            <a:lvl3pPr eaLnBrk="0">
+              <a:tabLst>
+                <a:tab pos="723900" algn="l"/>
+                <a:tab pos="1447800" algn="l"/>
+                <a:tab pos="2171700" algn="l"/>
+                <a:tab pos="2895600" algn="l"/>
+                <a:tab pos="3619500" algn="l"/>
+                <a:tab pos="4343400" algn="l"/>
+                <a:tab pos="5067300" algn="l"/>
+              </a:tabLst>
+              <a:defRPr sz="2400">
+                <a:solidFill>
+                  <a:schemeClr val="tx1"/>
+                </a:solidFill>
+                <a:latin typeface="Times New Roman" pitchFamily="18" charset="0"/>
+                <a:ea typeface="msgothic" charset="0"/>
+                <a:cs typeface="msgothic" charset="0"/>
+              </a:defRPr>
+            </a:lvl3pPr>
+            <a:lvl4pPr eaLnBrk="0">
+              <a:tabLst>
+                <a:tab pos="723900" algn="l"/>
+                <a:tab pos="1447800" algn="l"/>
+                <a:tab pos="2171700" algn="l"/>
+                <a:tab pos="2895600" algn="l"/>
+                <a:tab pos="3619500" algn="l"/>
+                <a:tab pos="4343400" algn="l"/>
+                <a:tab pos="5067300" algn="l"/>
+              </a:tabLst>
+              <a:defRPr sz="2400">
+                <a:solidFill>
+                  <a:schemeClr val="tx1"/>
+                </a:solidFill>
+                <a:latin typeface="Times New Roman" pitchFamily="18" charset="0"/>
+                <a:ea typeface="msgothic" charset="0"/>
+                <a:cs typeface="msgothic" charset="0"/>
+              </a:defRPr>
+            </a:lvl4pPr>
+            <a:lvl5pPr eaLnBrk="0">
+              <a:tabLst>
+                <a:tab pos="723900" algn="l"/>
+                <a:tab pos="1447800" algn="l"/>
+                <a:tab pos="2171700" algn="l"/>
+                <a:tab pos="2895600" algn="l"/>
+                <a:tab pos="3619500" algn="l"/>
+                <a:tab pos="4343400" algn="l"/>
+                <a:tab pos="5067300" algn="l"/>
+              </a:tabLst>
+              <a:defRPr sz="2400">
+                <a:solidFill>
+                  <a:schemeClr val="tx1"/>
+                </a:solidFill>
+                <a:latin typeface="Times New Roman" pitchFamily="18" charset="0"/>
+                <a:ea typeface="msgothic" charset="0"/>
+                <a:cs typeface="msgothic" charset="0"/>
+              </a:defRPr>
+            </a:lvl5pPr>
+            <a:lvl6pPr marL="1536700" indent="-215900" defTabSz="457200" eaLnBrk="0" fontAlgn="base" hangingPunct="0">
+              <a:lnSpc>
+                <a:spcPct val="93000"/>
+              </a:lnSpc>
+              <a:spcBef>
+                <a:spcPct val="0"/>
+              </a:spcBef>
+              <a:spcAft>
+                <a:spcPct val="0"/>
+              </a:spcAft>
+              <a:buClr>
+                <a:srgbClr val="000000"/>
+              </a:buClr>
+              <a:buSzPct val="45000"/>
+              <a:buFont typeface="Wingdings" pitchFamily="2" charset="2"/>
+              <a:tabLst>
+                <a:tab pos="723900" algn="l"/>
+                <a:tab pos="1447800" algn="l"/>
+                <a:tab pos="2171700" algn="l"/>
+                <a:tab pos="2895600" algn="l"/>
+                <a:tab pos="3619500" algn="l"/>
+                <a:tab pos="4343400" algn="l"/>
+                <a:tab pos="5067300" algn="l"/>
+              </a:tabLst>
+              <a:defRPr sz="2400">
+                <a:solidFill>
+                  <a:schemeClr val="tx1"/>
+                </a:solidFill>
+                <a:latin typeface="Times New Roman" pitchFamily="18" charset="0"/>
+                <a:ea typeface="msgothic" charset="0"/>
+                <a:cs typeface="msgothic" charset="0"/>
+              </a:defRPr>
+            </a:lvl6pPr>
+            <a:lvl7pPr marL="1993900" indent="-215900" defTabSz="457200" eaLnBrk="0" fontAlgn="base" hangingPunct="0">
+              <a:lnSpc>
+                <a:spcPct val="93000"/>
+              </a:lnSpc>
+              <a:spcBef>
+                <a:spcPct val="0"/>
+              </a:spcBef>
+              <a:spcAft>
+                <a:spcPct val="0"/>
+              </a:spcAft>
+              <a:buClr>
+                <a:srgbClr val="000000"/>
+              </a:buClr>
+              <a:buSzPct val="45000"/>
+              <a:buFont typeface="Wingdings" pitchFamily="2" charset="2"/>
+              <a:tabLst>
+                <a:tab pos="723900" algn="l"/>
+                <a:tab pos="1447800" algn="l"/>
+                <a:tab pos="2171700" algn="l"/>
+                <a:tab pos="2895600" algn="l"/>
+                <a:tab pos="3619500" algn="l"/>
+                <a:tab pos="4343400" algn="l"/>
+                <a:tab pos="5067300" algn="l"/>
+              </a:tabLst>
+              <a:defRPr sz="2400">
+                <a:solidFill>
+                  <a:schemeClr val="tx1"/>
+                </a:solidFill>
+                <a:latin typeface="Times New Roman" pitchFamily="18" charset="0"/>
+                <a:ea typeface="msgothic" charset="0"/>
+                <a:cs typeface="msgothic" charset="0"/>
+              </a:defRPr>
+            </a:lvl7pPr>
+            <a:lvl8pPr marL="2451100" indent="-215900" defTabSz="457200" eaLnBrk="0" fontAlgn="base" hangingPunct="0">
+              <a:lnSpc>
+                <a:spcPct val="93000"/>
+              </a:lnSpc>
+              <a:spcBef>
+                <a:spcPct val="0"/>
+              </a:spcBef>
+              <a:spcAft>
+                <a:spcPct val="0"/>
+              </a:spcAft>
+              <a:buClr>
+                <a:srgbClr val="000000"/>
+              </a:buClr>
+              <a:buSzPct val="45000"/>
+              <a:buFont typeface="Wingdings" pitchFamily="2" charset="2"/>
+              <a:tabLst>
+                <a:tab pos="723900" algn="l"/>
+                <a:tab pos="1447800" algn="l"/>
+                <a:tab pos="2171700" algn="l"/>
+                <a:tab pos="2895600" algn="l"/>
+                <a:tab pos="3619500" algn="l"/>
+                <a:tab pos="4343400" algn="l"/>
+                <a:tab pos="5067300" algn="l"/>
+              </a:tabLst>
+              <a:defRPr sz="2400">
+                <a:solidFill>
+                  <a:schemeClr val="tx1"/>
+                </a:solidFill>
+                <a:latin typeface="Times New Roman" pitchFamily="18" charset="0"/>
+                <a:ea typeface="msgothic" charset="0"/>
+                <a:cs typeface="msgothic" charset="0"/>
+              </a:defRPr>
+            </a:lvl8pPr>
+            <a:lvl9pPr marL="2908300" indent="-215900" defTabSz="457200" eaLnBrk="0" fontAlgn="base" hangingPunct="0">
+              <a:lnSpc>
+                <a:spcPct val="93000"/>
+              </a:lnSpc>
+              <a:spcBef>
+                <a:spcPct val="0"/>
+              </a:spcBef>
+              <a:spcAft>
+                <a:spcPct val="0"/>
+              </a:spcAft>
+              <a:buClr>
+                <a:srgbClr val="000000"/>
+              </a:buClr>
+              <a:buSzPct val="45000"/>
+              <a:buFont typeface="Wingdings" pitchFamily="2" charset="2"/>
+              <a:tabLst>
+                <a:tab pos="723900" algn="l"/>
+                <a:tab pos="1447800" algn="l"/>
+                <a:tab pos="2171700" algn="l"/>
+                <a:tab pos="2895600" algn="l"/>
+                <a:tab pos="3619500" algn="l"/>
+                <a:tab pos="4343400" algn="l"/>
+                <a:tab pos="5067300" algn="l"/>
+              </a:tabLst>
+              <a:defRPr sz="2400">
+                <a:solidFill>
+                  <a:schemeClr val="tx1"/>
+                </a:solidFill>
+                <a:latin typeface="Times New Roman" pitchFamily="18" charset="0"/>
+                <a:ea typeface="msgothic" charset="0"/>
+                <a:cs typeface="msgothic" charset="0"/>
+              </a:defRPr>
+            </a:lvl9pPr>
+          </a:lstStyle>
+          <a:p>
+            <a:pPr eaLnBrk="1"/>
+            <a:r>
+              <a:rPr lang="en-GB" altLang="fr-FR" sz="900">
+                <a:solidFill>
+                  <a:srgbClr val="000000"/>
+                </a:solidFill>
+                <a:latin typeface="Arial" pitchFamily="34" charset="0"/>
+              </a:rPr>
+              <a:t>Copyright © 2015 by the Genetics Society of America</a:t>
+            </a:r>
+          </a:p>
+        </p:txBody>
+      </p:sp>
+      <p:sp>
+        <p:nvSpPr>
+          <p:cNvPr id="3" name="ZoneTexte 2"/>
+          <p:cNvSpPr txBox="1"/>
+          <p:nvPr/>
+        </p:nvSpPr>
+        <p:spPr>
+          <a:xfrm>
+            <a:off x="367735" y="116632"/>
+            <a:ext cx="3184141" cy="584775"/>
+          </a:xfrm>
+          <a:prstGeom prst="rect">
+            <a:avLst/>
+          </a:prstGeom>
+          <a:noFill/>
+        </p:spPr>
+        <p:txBody>
+          <a:bodyPr wrap="none" rtlCol="0">
+            <a:spAutoFit/>
+          </a:bodyPr>
+          <a:lstStyle/>
+          <a:p>
+            <a:r>
+              <a:rPr lang="en-US" sz="3200" dirty="0" err="1" smtClean="0"/>
+              <a:t>Analyse</a:t>
+            </a:r>
+            <a:r>
+              <a:rPr lang="en-US" sz="3200" dirty="0" smtClean="0"/>
+              <a:t> de traits</a:t>
+            </a:r>
+            <a:endParaRPr lang="en-US" sz="3200" dirty="0"/>
+          </a:p>
+        </p:txBody>
+      </p:sp>
+    </p:spTree>
+    <p:extLst>
+      <p:ext uri="{BB962C8B-B14F-4D97-AF65-F5344CB8AC3E}">
+        <p14:creationId xmlns:p14="http://schemas.microsoft.com/office/powerpoint/2010/main" val="2812206840"/>
+      </p:ext>
+    </p:extLst>
+  </p:cSld>
+  <p:clrMapOvr>
+    <a:masterClrMapping/>
+  </p:clrMapOvr>
+  <p:transition spd="med"/>
+  <p:timing>
+    <p:tnLst>
+      <p:par>
+        <p:cTn id="1" dur="indefinite" restart="never" nodeType="tmRoot">
+          <p:childTnLst>
+            <p:seq concurrent="1" nextAc="seek">
+              <p:cTn id="2" dur="0" nodeType="mainSeq"/>
+              <p:prevCondLst>
+                <p:cond evt="onPrev" delay="0">
+                  <p:tgtEl>
+                    <p:sldTgt/>
+                  </p:tgtEl>
+                </p:cond>
+              </p:prevCondLst>
+              <p:nextCondLst>
+                <p:cond evt="onNext" delay="0">
+                  <p:tgtEl>
+                    <p:sldTgt/>
+                  </p:tgtEl>
+                </p:cond>
+              </p:nextCondLst>
+            </p:seq>
+          </p:childTnLst>
+        </p:cTn>
+      </p:par>
+    </p:tnLst>
+  </p:timing>
+</p:sld>
+</file>
+
+<file path=ppt/slides/slide6.xml><?xml version="1.0" encoding="utf-8"?>
+<p:sld xmlns:a="http://schemas.openxmlformats.org/drawingml/2006/main" xmlns:r="http://schemas.openxmlformats.org/officeDocument/2006/relationships" xmlns:p="http://schemas.openxmlformats.org/presentationml/2006/main">
+  <p:cSld>
+    <p:spTree>
+      <p:nvGrpSpPr>
+        <p:cNvPr id="1" name=""/>
+        <p:cNvGrpSpPr/>
+        <p:nvPr/>
+      </p:nvGrpSpPr>
+      <p:grpSpPr>
+        <a:xfrm>
+          <a:off x="0" y="0"/>
+          <a:ext cx="0" cy="0"/>
+          <a:chOff x="0" y="0"/>
+          <a:chExt cx="0" cy="0"/>
+        </a:xfrm>
+      </p:grpSpPr>
+      <p:sp>
+        <p:nvSpPr>
           <p:cNvPr id="2" name="Rectangle 1"/>
           <p:cNvSpPr/>
           <p:nvPr/>

</xml_diff>